<commit_message>
fix: remove FK slide from `Models.pdf`
</commit_message>
<xml_diff>
--- a/Aula 04/Models.pptx
+++ b/Aula 04/Models.pptx
@@ -5,7 +5,7 @@
     <p:sldMasterId id="2147483648" r:id="rId1"/>
   </p:sldMasterIdLst>
   <p:notesMasterIdLst>
-    <p:notesMasterId r:id="rId20"/>
+    <p:notesMasterId r:id="rId19"/>
   </p:notesMasterIdLst>
   <p:sldIdLst>
     <p:sldId id="257" r:id="rId2"/>
@@ -20,12 +20,11 @@
     <p:sldId id="267" r:id="rId11"/>
     <p:sldId id="268" r:id="rId12"/>
     <p:sldId id="270" r:id="rId13"/>
-    <p:sldId id="271" r:id="rId14"/>
-    <p:sldId id="272" r:id="rId15"/>
-    <p:sldId id="274" r:id="rId16"/>
-    <p:sldId id="277" r:id="rId17"/>
-    <p:sldId id="276" r:id="rId18"/>
-    <p:sldId id="275" r:id="rId19"/>
+    <p:sldId id="272" r:id="rId14"/>
+    <p:sldId id="274" r:id="rId15"/>
+    <p:sldId id="277" r:id="rId16"/>
+    <p:sldId id="276" r:id="rId17"/>
+    <p:sldId id="275" r:id="rId18"/>
   </p:sldIdLst>
   <p:sldSz cx="12192000" cy="6858000"/>
   <p:notesSz cx="6858000" cy="9144000"/>
@@ -214,7 +213,7 @@
           <a:p>
             <a:fld id="{4440A938-EE45-4CF6-9305-556CFB7B5057}" type="datetimeFigureOut">
               <a:rPr lang="pt-BR" smtClean="0"/>
-              <a:t>10/02/2026</a:t>
+              <a:t>20/02/2026</a:t>
             </a:fld>
             <a:endParaRPr lang="pt-BR"/>
           </a:p>
@@ -628,7 +627,7 @@
           <a:p>
             <a:fld id="{E2A3D7A4-D674-4F04-B457-5A75143D3A24}" type="datetimeFigureOut">
               <a:rPr lang="pt-BR" smtClean="0"/>
-              <a:t>10/02/2026</a:t>
+              <a:t>20/02/2026</a:t>
             </a:fld>
             <a:endParaRPr lang="pt-BR"/>
           </a:p>
@@ -826,7 +825,7 @@
           <a:p>
             <a:fld id="{E2A3D7A4-D674-4F04-B457-5A75143D3A24}" type="datetimeFigureOut">
               <a:rPr lang="pt-BR" smtClean="0"/>
-              <a:t>10/02/2026</a:t>
+              <a:t>20/02/2026</a:t>
             </a:fld>
             <a:endParaRPr lang="pt-BR"/>
           </a:p>
@@ -1034,7 +1033,7 @@
           <a:p>
             <a:fld id="{E2A3D7A4-D674-4F04-B457-5A75143D3A24}" type="datetimeFigureOut">
               <a:rPr lang="pt-BR" smtClean="0"/>
-              <a:t>10/02/2026</a:t>
+              <a:t>20/02/2026</a:t>
             </a:fld>
             <a:endParaRPr lang="pt-BR"/>
           </a:p>
@@ -1232,7 +1231,7 @@
           <a:p>
             <a:fld id="{E2A3D7A4-D674-4F04-B457-5A75143D3A24}" type="datetimeFigureOut">
               <a:rPr lang="pt-BR" smtClean="0"/>
-              <a:t>10/02/2026</a:t>
+              <a:t>20/02/2026</a:t>
             </a:fld>
             <a:endParaRPr lang="pt-BR"/>
           </a:p>
@@ -1507,7 +1506,7 @@
           <a:p>
             <a:fld id="{E2A3D7A4-D674-4F04-B457-5A75143D3A24}" type="datetimeFigureOut">
               <a:rPr lang="pt-BR" smtClean="0"/>
-              <a:t>10/02/2026</a:t>
+              <a:t>20/02/2026</a:t>
             </a:fld>
             <a:endParaRPr lang="pt-BR"/>
           </a:p>
@@ -1772,7 +1771,7 @@
           <a:p>
             <a:fld id="{E2A3D7A4-D674-4F04-B457-5A75143D3A24}" type="datetimeFigureOut">
               <a:rPr lang="pt-BR" smtClean="0"/>
-              <a:t>10/02/2026</a:t>
+              <a:t>20/02/2026</a:t>
             </a:fld>
             <a:endParaRPr lang="pt-BR"/>
           </a:p>
@@ -2184,7 +2183,7 @@
           <a:p>
             <a:fld id="{E2A3D7A4-D674-4F04-B457-5A75143D3A24}" type="datetimeFigureOut">
               <a:rPr lang="pt-BR" smtClean="0"/>
-              <a:t>10/02/2026</a:t>
+              <a:t>20/02/2026</a:t>
             </a:fld>
             <a:endParaRPr lang="pt-BR"/>
           </a:p>
@@ -2325,7 +2324,7 @@
           <a:p>
             <a:fld id="{E2A3D7A4-D674-4F04-B457-5A75143D3A24}" type="datetimeFigureOut">
               <a:rPr lang="pt-BR" smtClean="0"/>
-              <a:t>10/02/2026</a:t>
+              <a:t>20/02/2026</a:t>
             </a:fld>
             <a:endParaRPr lang="pt-BR"/>
           </a:p>
@@ -2438,7 +2437,7 @@
           <a:p>
             <a:fld id="{E2A3D7A4-D674-4F04-B457-5A75143D3A24}" type="datetimeFigureOut">
               <a:rPr lang="pt-BR" smtClean="0"/>
-              <a:t>10/02/2026</a:t>
+              <a:t>20/02/2026</a:t>
             </a:fld>
             <a:endParaRPr lang="pt-BR"/>
           </a:p>
@@ -2749,7 +2748,7 @@
           <a:p>
             <a:fld id="{E2A3D7A4-D674-4F04-B457-5A75143D3A24}" type="datetimeFigureOut">
               <a:rPr lang="pt-BR" smtClean="0"/>
-              <a:t>10/02/2026</a:t>
+              <a:t>20/02/2026</a:t>
             </a:fld>
             <a:endParaRPr lang="pt-BR"/>
           </a:p>
@@ -3037,7 +3036,7 @@
           <a:p>
             <a:fld id="{E2A3D7A4-D674-4F04-B457-5A75143D3A24}" type="datetimeFigureOut">
               <a:rPr lang="pt-BR" smtClean="0"/>
-              <a:t>10/02/2026</a:t>
+              <a:t>20/02/2026</a:t>
             </a:fld>
             <a:endParaRPr lang="pt-BR"/>
           </a:p>
@@ -3278,7 +3277,7 @@
           <a:p>
             <a:fld id="{E2A3D7A4-D674-4F04-B457-5A75143D3A24}" type="datetimeFigureOut">
               <a:rPr lang="pt-BR" smtClean="0"/>
-              <a:t>10/02/2026</a:t>
+              <a:t>20/02/2026</a:t>
             </a:fld>
             <a:endParaRPr lang="pt-BR"/>
           </a:p>
@@ -5051,108 +5050,6 @@
         <p:cNvPr id="1" name="">
           <a:extLst>
             <a:ext uri="{FF2B5EF4-FFF2-40B4-BE49-F238E27FC236}">
-              <a16:creationId xmlns:a16="http://schemas.microsoft.com/office/drawing/2014/main" id="{4D5CAF60-821D-41B0-1321-DD12AD3E57C4}"/>
-            </a:ext>
-          </a:extLst>
-        </p:cNvPr>
-        <p:cNvGrpSpPr/>
-        <p:nvPr/>
-      </p:nvGrpSpPr>
-      <p:grpSpPr>
-        <a:xfrm>
-          <a:off x="0" y="0"/>
-          <a:ext cx="0" cy="0"/>
-          <a:chOff x="0" y="0"/>
-          <a:chExt cx="0" cy="0"/>
-        </a:xfrm>
-      </p:grpSpPr>
-      <p:pic>
-        <p:nvPicPr>
-          <p:cNvPr id="5" name="Imagem 4">
-            <a:extLst>
-              <a:ext uri="{FF2B5EF4-FFF2-40B4-BE49-F238E27FC236}">
-                <a16:creationId xmlns:a16="http://schemas.microsoft.com/office/drawing/2014/main" id="{F7610CA9-A525-DEF8-EFD5-D3278795D9E9}"/>
-              </a:ext>
-            </a:extLst>
-          </p:cNvPr>
-          <p:cNvPicPr>
-            <a:picLocks noChangeAspect="1"/>
-          </p:cNvPicPr>
-          <p:nvPr/>
-        </p:nvPicPr>
-        <p:blipFill>
-          <a:blip r:embed="rId2">
-            <a:extLst>
-              <a:ext uri="{28A0092B-C50C-407E-A947-70E740481C1C}">
-                <a14:useLocalDpi xmlns:a14="http://schemas.microsoft.com/office/drawing/2010/main" val="0"/>
-              </a:ext>
-            </a:extLst>
-          </a:blip>
-          <a:stretch>
-            <a:fillRect/>
-          </a:stretch>
-        </p:blipFill>
-        <p:spPr>
-          <a:xfrm>
-            <a:off x="0" y="0"/>
-            <a:ext cx="12192000" cy="6858000"/>
-          </a:xfrm>
-          <a:prstGeom prst="rect">
-            <a:avLst/>
-          </a:prstGeom>
-        </p:spPr>
-      </p:pic>
-      <p:pic>
-        <p:nvPicPr>
-          <p:cNvPr id="3" name="Imagem 2">
-            <a:extLst>
-              <a:ext uri="{FF2B5EF4-FFF2-40B4-BE49-F238E27FC236}">
-                <a16:creationId xmlns:a16="http://schemas.microsoft.com/office/drawing/2014/main" id="{42BC9A07-F41E-C7CA-21D9-EBDF1B10FA58}"/>
-              </a:ext>
-            </a:extLst>
-          </p:cNvPr>
-          <p:cNvPicPr>
-            <a:picLocks noChangeAspect="1"/>
-          </p:cNvPicPr>
-          <p:nvPr/>
-        </p:nvPicPr>
-        <p:blipFill>
-          <a:blip r:embed="rId3"/>
-          <a:stretch>
-            <a:fillRect/>
-          </a:stretch>
-        </p:blipFill>
-        <p:spPr>
-          <a:xfrm>
-            <a:off x="561202" y="623496"/>
-            <a:ext cx="11069595" cy="5611008"/>
-          </a:xfrm>
-          <a:prstGeom prst="rect">
-            <a:avLst/>
-          </a:prstGeom>
-        </p:spPr>
-      </p:pic>
-    </p:spTree>
-    <p:extLst>
-      <p:ext uri="{BB962C8B-B14F-4D97-AF65-F5344CB8AC3E}">
-        <p14:creationId xmlns:p14="http://schemas.microsoft.com/office/powerpoint/2010/main" val="2124319770"/>
-      </p:ext>
-    </p:extLst>
-  </p:cSld>
-  <p:clrMapOvr>
-    <a:masterClrMapping/>
-  </p:clrMapOvr>
-</p:sld>
-</file>
-
-<file path=ppt/slides/slide14.xml><?xml version="1.0" encoding="utf-8"?>
-<p:sld xmlns:a="http://schemas.openxmlformats.org/drawingml/2006/main" xmlns:r="http://schemas.openxmlformats.org/officeDocument/2006/relationships" xmlns:p="http://schemas.openxmlformats.org/presentationml/2006/main">
-  <p:cSld>
-    <p:spTree>
-      <p:nvGrpSpPr>
-        <p:cNvPr id="1" name="">
-          <a:extLst>
-            <a:ext uri="{FF2B5EF4-FFF2-40B4-BE49-F238E27FC236}">
               <a16:creationId xmlns:a16="http://schemas.microsoft.com/office/drawing/2014/main" id="{70CC0F05-0A0D-2A30-D252-18EF80FB3A4D}"/>
             </a:ext>
           </a:extLst>
@@ -5247,7 +5144,7 @@
 </p:sld>
 </file>
 
-<file path=ppt/slides/slide15.xml><?xml version="1.0" encoding="utf-8"?>
+<file path=ppt/slides/slide14.xml><?xml version="1.0" encoding="utf-8"?>
 <p:sld xmlns:a="http://schemas.openxmlformats.org/drawingml/2006/main" xmlns:r="http://schemas.openxmlformats.org/officeDocument/2006/relationships" xmlns:p="http://schemas.openxmlformats.org/presentationml/2006/main">
   <p:cSld>
     <p:spTree>
@@ -5767,7 +5664,7 @@
 </p:sld>
 </file>
 
-<file path=ppt/slides/slide16.xml><?xml version="1.0" encoding="utf-8"?>
+<file path=ppt/slides/slide15.xml><?xml version="1.0" encoding="utf-8"?>
 <p:sld xmlns:a="http://schemas.openxmlformats.org/drawingml/2006/main" xmlns:r="http://schemas.openxmlformats.org/officeDocument/2006/relationships" xmlns:p="http://schemas.openxmlformats.org/presentationml/2006/main">
   <p:cSld>
     <p:spTree>
@@ -6282,7 +6179,7 @@
 </p:sld>
 </file>
 
-<file path=ppt/slides/slide17.xml><?xml version="1.0" encoding="utf-8"?>
+<file path=ppt/slides/slide16.xml><?xml version="1.0" encoding="utf-8"?>
 <p:sld xmlns:a="http://schemas.openxmlformats.org/drawingml/2006/main" xmlns:r="http://schemas.openxmlformats.org/officeDocument/2006/relationships" xmlns:p="http://schemas.openxmlformats.org/presentationml/2006/main">
   <p:cSld>
     <p:spTree>
@@ -6769,7 +6666,7 @@
 </p:sld>
 </file>
 
-<file path=ppt/slides/slide18.xml><?xml version="1.0" encoding="utf-8"?>
+<file path=ppt/slides/slide17.xml><?xml version="1.0" encoding="utf-8"?>
 <p:sld xmlns:a="http://schemas.openxmlformats.org/drawingml/2006/main" xmlns:r="http://schemas.openxmlformats.org/officeDocument/2006/relationships" xmlns:p="http://schemas.openxmlformats.org/presentationml/2006/main">
   <p:cSld>
     <p:spTree>

</xml_diff>